<commit_message>
Linkovi za dalje ucenje
</commit_message>
<xml_diff>
--- a/.NET Core i Angular Web Dev.pptx
+++ b/.NET Core i Angular Web Dev.pptx
@@ -6,7 +6,7 @@
     <p:sldMasterId id="2147483661" r:id="rId2"/>
   </p:sldMasterIdLst>
   <p:notesMasterIdLst>
-    <p:notesMasterId r:id="rId26"/>
+    <p:notesMasterId r:id="rId27"/>
   </p:notesMasterIdLst>
   <p:sldIdLst>
     <p:sldId id="256" r:id="rId3"/>
@@ -32,6 +32,7 @@
     <p:sldId id="278" r:id="rId23"/>
     <p:sldId id="279" r:id="rId24"/>
     <p:sldId id="280" r:id="rId25"/>
+    <p:sldId id="281" r:id="rId26"/>
   </p:sldIdLst>
   <p:sldSz cx="9144000" cy="5143500" type="screen16x9"/>
   <p:notesSz cx="6858000" cy="9144000"/>
@@ -158,6 +159,7 @@
             <p14:sldId id="278"/>
             <p14:sldId id="279"/>
             <p14:sldId id="280"/>
+            <p14:sldId id="281"/>
           </p14:sldIdLst>
         </p14:section>
       </p14:sectionLst>
@@ -8251,14 +8253,7 @@
                 <a:latin typeface="Arial" panose="020B0604020202020204" pitchFamily="34" charset="0"/>
                 <a:cs typeface="Arial" panose="020B0604020202020204" pitchFamily="34" charset="0"/>
               </a:rPr>
-              <a:t>Rezultat pomoću </a:t>
-            </a:r>
-            <a:r>
-              <a:rPr lang="sr-Latn-RS" sz="1400" dirty="0" smtClean="0">
-                <a:latin typeface="Arial" panose="020B0604020202020204" pitchFamily="34" charset="0"/>
-                <a:cs typeface="Arial" panose="020B0604020202020204" pitchFamily="34" charset="0"/>
-              </a:rPr>
-              <a:t>Postman alata</a:t>
+              <a:t>Rezultat pomoću Postman alata</a:t>
             </a:r>
             <a:endParaRPr lang="en-US" sz="1400" dirty="0">
               <a:latin typeface="Arial" panose="020B0604020202020204" pitchFamily="34" charset="0"/>
@@ -11099,6 +11094,639 @@
                                         <p:cTn id="14" dur="500" fill="hold"/>
                                         <p:tgtEl>
                                           <p:spTgt spid="2"/>
+                                        </p:tgtEl>
+                                        <p:attrNameLst>
+                                          <p:attrName>ppt_y</p:attrName>
+                                        </p:attrNameLst>
+                                      </p:cBhvr>
+                                      <p:tavLst>
+                                        <p:tav tm="0">
+                                          <p:val>
+                                            <p:strVal val="1+#ppt_h/2"/>
+                                          </p:val>
+                                        </p:tav>
+                                        <p:tav tm="100000">
+                                          <p:val>
+                                            <p:strVal val="#ppt_y"/>
+                                          </p:val>
+                                        </p:tav>
+                                      </p:tavLst>
+                                    </p:anim>
+                                  </p:childTnLst>
+                                </p:cTn>
+                              </p:par>
+                            </p:childTnLst>
+                          </p:cTn>
+                        </p:par>
+                      </p:childTnLst>
+                    </p:cTn>
+                  </p:par>
+                </p:childTnLst>
+              </p:cTn>
+              <p:prevCondLst>
+                <p:cond evt="onPrev" delay="0">
+                  <p:tgtEl>
+                    <p:sldTgt/>
+                  </p:tgtEl>
+                </p:cond>
+              </p:prevCondLst>
+              <p:nextCondLst>
+                <p:cond evt="onNext" delay="0">
+                  <p:tgtEl>
+                    <p:sldTgt/>
+                  </p:tgtEl>
+                </p:cond>
+              </p:nextCondLst>
+            </p:seq>
+          </p:childTnLst>
+        </p:cTn>
+      </p:par>
+    </p:tnLst>
+    <p:bldLst>
+      <p:bldP spid="4" grpId="0"/>
+    </p:bldLst>
+  </p:timing>
+</p:sld>
+</file>
+
+<file path=ppt/slides/slide24.xml><?xml version="1.0" encoding="utf-8"?>
+<p:sld xmlns:a="http://schemas.openxmlformats.org/drawingml/2006/main" xmlns:r="http://schemas.openxmlformats.org/officeDocument/2006/relationships" xmlns:p="http://schemas.openxmlformats.org/presentationml/2006/main">
+  <p:cSld>
+    <p:spTree>
+      <p:nvGrpSpPr>
+        <p:cNvPr id="1" name=""/>
+        <p:cNvGrpSpPr/>
+        <p:nvPr/>
+      </p:nvGrpSpPr>
+      <p:grpSpPr>
+        <a:xfrm>
+          <a:off x="0" y="0"/>
+          <a:ext cx="0" cy="0"/>
+          <a:chOff x="0" y="0"/>
+          <a:chExt cx="0" cy="0"/>
+        </a:xfrm>
+      </p:grpSpPr>
+      <p:sp>
+        <p:nvSpPr>
+          <p:cNvPr id="3" name="Title 2"/>
+          <p:cNvSpPr>
+            <a:spLocks noGrp="1"/>
+          </p:cNvSpPr>
+          <p:nvPr>
+            <p:ph type="title"/>
+          </p:nvPr>
+        </p:nvSpPr>
+        <p:spPr>
+          <a:xfrm>
+            <a:off x="1619672" y="-1"/>
+            <a:ext cx="7524328" cy="1204179"/>
+          </a:xfrm>
+        </p:spPr>
+        <p:txBody>
+          <a:bodyPr/>
+          <a:lstStyle/>
+          <a:p>
+            <a:pPr algn="ctr"/>
+            <a:r>
+              <a:rPr lang="en-US" altLang="ko-KR" dirty="0" err="1" smtClean="0"/>
+              <a:t>Dodatni</a:t>
+            </a:r>
+            <a:r>
+              <a:rPr lang="en-US" altLang="ko-KR" dirty="0" smtClean="0"/>
+              <a:t> </a:t>
+            </a:r>
+            <a:r>
+              <a:rPr lang="en-US" altLang="ko-KR" dirty="0" err="1" smtClean="0"/>
+              <a:t>Materijal</a:t>
+            </a:r>
+            <a:r>
+              <a:rPr lang="en-US" altLang="ko-KR" dirty="0" smtClean="0"/>
+              <a:t> </a:t>
+            </a:r>
+            <a:r>
+              <a:rPr lang="en-US" altLang="ko-KR" dirty="0" err="1" smtClean="0"/>
+              <a:t>za</a:t>
+            </a:r>
+            <a:r>
+              <a:rPr lang="en-US" altLang="ko-KR" dirty="0" smtClean="0"/>
+              <a:t> .NET Core</a:t>
+            </a:r>
+            <a:endParaRPr lang="ko-KR" altLang="en-US" dirty="0"/>
+          </a:p>
+        </p:txBody>
+      </p:sp>
+      <p:sp>
+        <p:nvSpPr>
+          <p:cNvPr id="4" name="TextBox 3"/>
+          <p:cNvSpPr txBox="1"/>
+          <p:nvPr/>
+        </p:nvSpPr>
+        <p:spPr>
+          <a:xfrm>
+            <a:off x="1619672" y="1131590"/>
+            <a:ext cx="7200800" cy="3754874"/>
+          </a:xfrm>
+          <a:prstGeom prst="rect">
+            <a:avLst/>
+          </a:prstGeom>
+          <a:noFill/>
+        </p:spPr>
+        <p:txBody>
+          <a:bodyPr wrap="square" rtlCol="0">
+            <a:spAutoFit/>
+          </a:bodyPr>
+          <a:lstStyle/>
+          <a:p>
+            <a:r>
+              <a:rPr lang="en-US" sz="1400" dirty="0" err="1" smtClean="0">
+                <a:latin typeface="Arial" panose="020B0604020202020204" pitchFamily="34" charset="0"/>
+                <a:cs typeface="Arial" panose="020B0604020202020204" pitchFamily="34" charset="0"/>
+              </a:rPr>
+              <a:t>.Net</a:t>
+            </a:r>
+            <a:r>
+              <a:rPr lang="en-US" sz="1400" dirty="0" smtClean="0">
+                <a:latin typeface="Arial" panose="020B0604020202020204" pitchFamily="34" charset="0"/>
+                <a:cs typeface="Arial" panose="020B0604020202020204" pitchFamily="34" charset="0"/>
+              </a:rPr>
+              <a:t> Core Web </a:t>
+            </a:r>
+            <a:r>
+              <a:rPr lang="en-US" sz="1400" dirty="0" err="1" smtClean="0">
+                <a:latin typeface="Arial" panose="020B0604020202020204" pitchFamily="34" charset="0"/>
+                <a:cs typeface="Arial" panose="020B0604020202020204" pitchFamily="34" charset="0"/>
+              </a:rPr>
+              <a:t>Api</a:t>
+            </a:r>
+            <a:r>
+              <a:rPr lang="en-US" sz="1400" dirty="0" smtClean="0">
+                <a:latin typeface="Arial" panose="020B0604020202020204" pitchFamily="34" charset="0"/>
+                <a:cs typeface="Arial" panose="020B0604020202020204" pitchFamily="34" charset="0"/>
+              </a:rPr>
+              <a:t> </a:t>
+            </a:r>
+            <a:r>
+              <a:rPr lang="en-US" sz="1400" dirty="0" err="1" smtClean="0">
+                <a:latin typeface="Arial" panose="020B0604020202020204" pitchFamily="34" charset="0"/>
+                <a:cs typeface="Arial" panose="020B0604020202020204" pitchFamily="34" charset="0"/>
+              </a:rPr>
+              <a:t>Detaljnije</a:t>
+            </a:r>
+            <a:r>
+              <a:rPr lang="en-US" sz="1400" dirty="0">
+                <a:latin typeface="Arial" panose="020B0604020202020204" pitchFamily="34" charset="0"/>
+                <a:cs typeface="Arial" panose="020B0604020202020204" pitchFamily="34" charset="0"/>
+              </a:rPr>
+              <a:t> =&gt; </a:t>
+            </a:r>
+            <a:r>
+              <a:rPr lang="en-US" sz="1400" dirty="0">
+                <a:latin typeface="Arial" panose="020B0604020202020204" pitchFamily="34" charset="0"/>
+                <a:cs typeface="Arial" panose="020B0604020202020204" pitchFamily="34" charset="0"/>
+                <a:hlinkClick r:id="rId2"/>
+              </a:rPr>
+              <a:t>https://code-maze.com/net-core-series</a:t>
+            </a:r>
+            <a:r>
+              <a:rPr lang="en-US" sz="1400" dirty="0" smtClean="0">
+                <a:latin typeface="Arial" panose="020B0604020202020204" pitchFamily="34" charset="0"/>
+                <a:cs typeface="Arial" panose="020B0604020202020204" pitchFamily="34" charset="0"/>
+                <a:hlinkClick r:id="rId2"/>
+              </a:rPr>
+              <a:t>/</a:t>
+            </a:r>
+            <a:endParaRPr lang="en-US" sz="1400" dirty="0" smtClean="0">
+              <a:latin typeface="Arial" panose="020B0604020202020204" pitchFamily="34" charset="0"/>
+              <a:cs typeface="Arial" panose="020B0604020202020204" pitchFamily="34" charset="0"/>
+            </a:endParaRPr>
+          </a:p>
+          <a:p>
+            <a:endParaRPr lang="en-US" sz="1400" dirty="0">
+              <a:latin typeface="Arial" panose="020B0604020202020204" pitchFamily="34" charset="0"/>
+              <a:cs typeface="Arial" panose="020B0604020202020204" pitchFamily="34" charset="0"/>
+            </a:endParaRPr>
+          </a:p>
+          <a:p>
+            <a:r>
+              <a:rPr lang="en-US" sz="1400" dirty="0" smtClean="0">
+                <a:latin typeface="Arial" panose="020B0604020202020204" pitchFamily="34" charset="0"/>
+                <a:cs typeface="Arial" panose="020B0604020202020204" pitchFamily="34" charset="0"/>
+              </a:rPr>
+              <a:t>Global </a:t>
+            </a:r>
+            <a:r>
+              <a:rPr lang="en-US" sz="1400" dirty="0">
+                <a:latin typeface="Arial" panose="020B0604020202020204" pitchFamily="34" charset="0"/>
+                <a:cs typeface="Arial" panose="020B0604020202020204" pitchFamily="34" charset="0"/>
+              </a:rPr>
+              <a:t>Error Handling =&gt; </a:t>
+            </a:r>
+            <a:r>
+              <a:rPr lang="en-US" sz="1400" dirty="0">
+                <a:latin typeface="Arial" panose="020B0604020202020204" pitchFamily="34" charset="0"/>
+                <a:cs typeface="Arial" panose="020B0604020202020204" pitchFamily="34" charset="0"/>
+                <a:hlinkClick r:id="rId3"/>
+              </a:rPr>
+              <a:t>https://code-maze.com/global-error-handling-aspnetcore</a:t>
+            </a:r>
+            <a:r>
+              <a:rPr lang="en-US" sz="1400" dirty="0" smtClean="0">
+                <a:latin typeface="Arial" panose="020B0604020202020204" pitchFamily="34" charset="0"/>
+                <a:cs typeface="Arial" panose="020B0604020202020204" pitchFamily="34" charset="0"/>
+                <a:hlinkClick r:id="rId3"/>
+              </a:rPr>
+              <a:t>/</a:t>
+            </a:r>
+            <a:endParaRPr lang="en-US" sz="1400" dirty="0" smtClean="0">
+              <a:latin typeface="Arial" panose="020B0604020202020204" pitchFamily="34" charset="0"/>
+              <a:cs typeface="Arial" panose="020B0604020202020204" pitchFamily="34" charset="0"/>
+            </a:endParaRPr>
+          </a:p>
+          <a:p>
+            <a:endParaRPr lang="en-US" sz="1400" dirty="0">
+              <a:latin typeface="Arial" panose="020B0604020202020204" pitchFamily="34" charset="0"/>
+              <a:cs typeface="Arial" panose="020B0604020202020204" pitchFamily="34" charset="0"/>
+            </a:endParaRPr>
+          </a:p>
+          <a:p>
+            <a:r>
+              <a:rPr lang="en-US" sz="1400" dirty="0" smtClean="0">
+                <a:latin typeface="Arial" panose="020B0604020202020204" pitchFamily="34" charset="0"/>
+                <a:cs typeface="Arial" panose="020B0604020202020204" pitchFamily="34" charset="0"/>
+              </a:rPr>
+              <a:t>Action Filters </a:t>
+            </a:r>
+            <a:r>
+              <a:rPr lang="en-US" sz="1400" dirty="0" err="1" smtClean="0">
+                <a:latin typeface="Arial" panose="020B0604020202020204" pitchFamily="34" charset="0"/>
+                <a:cs typeface="Arial" panose="020B0604020202020204" pitchFamily="34" charset="0"/>
+              </a:rPr>
+              <a:t>kako</a:t>
+            </a:r>
+            <a:r>
+              <a:rPr lang="en-US" sz="1400" dirty="0" smtClean="0">
+                <a:latin typeface="Arial" panose="020B0604020202020204" pitchFamily="34" charset="0"/>
+                <a:cs typeface="Arial" panose="020B0604020202020204" pitchFamily="34" charset="0"/>
+              </a:rPr>
+              <a:t> </a:t>
+            </a:r>
+            <a:r>
+              <a:rPr lang="en-US" sz="1400" dirty="0" err="1" smtClean="0">
+                <a:latin typeface="Arial" panose="020B0604020202020204" pitchFamily="34" charset="0"/>
+                <a:cs typeface="Arial" panose="020B0604020202020204" pitchFamily="34" charset="0"/>
+              </a:rPr>
+              <a:t>pisati</a:t>
+            </a:r>
+            <a:r>
+              <a:rPr lang="en-US" sz="1400" dirty="0" smtClean="0">
+                <a:latin typeface="Arial" panose="020B0604020202020204" pitchFamily="34" charset="0"/>
+                <a:cs typeface="Arial" panose="020B0604020202020204" pitchFamily="34" charset="0"/>
+              </a:rPr>
+              <a:t> </a:t>
+            </a:r>
+            <a:r>
+              <a:rPr lang="en-US" sz="1400" dirty="0" err="1" smtClean="0">
+                <a:latin typeface="Arial" panose="020B0604020202020204" pitchFamily="34" charset="0"/>
+                <a:cs typeface="Arial" panose="020B0604020202020204" pitchFamily="34" charset="0"/>
+              </a:rPr>
+              <a:t>cistije</a:t>
+            </a:r>
+            <a:r>
+              <a:rPr lang="en-US" sz="1400" dirty="0" smtClean="0">
+                <a:latin typeface="Arial" panose="020B0604020202020204" pitchFamily="34" charset="0"/>
+                <a:cs typeface="Arial" panose="020B0604020202020204" pitchFamily="34" charset="0"/>
+              </a:rPr>
+              <a:t> </a:t>
+            </a:r>
+            <a:r>
+              <a:rPr lang="en-US" sz="1400" dirty="0" err="1" smtClean="0">
+                <a:latin typeface="Arial" panose="020B0604020202020204" pitchFamily="34" charset="0"/>
+                <a:cs typeface="Arial" panose="020B0604020202020204" pitchFamily="34" charset="0"/>
+              </a:rPr>
+              <a:t>akcije</a:t>
+            </a:r>
+            <a:r>
+              <a:rPr lang="en-US" sz="1400" dirty="0">
+                <a:latin typeface="Arial" panose="020B0604020202020204" pitchFamily="34" charset="0"/>
+                <a:cs typeface="Arial" panose="020B0604020202020204" pitchFamily="34" charset="0"/>
+              </a:rPr>
+              <a:t> </a:t>
+            </a:r>
+            <a:r>
+              <a:rPr lang="en-US" sz="1400" dirty="0" smtClean="0">
+                <a:latin typeface="Arial" panose="020B0604020202020204" pitchFamily="34" charset="0"/>
+                <a:cs typeface="Arial" panose="020B0604020202020204" pitchFamily="34" charset="0"/>
+              </a:rPr>
+              <a:t>=&gt; </a:t>
+            </a:r>
+            <a:r>
+              <a:rPr lang="en-US" sz="1400" dirty="0" smtClean="0">
+                <a:latin typeface="Arial" panose="020B0604020202020204" pitchFamily="34" charset="0"/>
+                <a:cs typeface="Arial" panose="020B0604020202020204" pitchFamily="34" charset="0"/>
+                <a:hlinkClick r:id="rId4"/>
+              </a:rPr>
+              <a:t>https</a:t>
+            </a:r>
+            <a:r>
+              <a:rPr lang="en-US" sz="1400" dirty="0">
+                <a:latin typeface="Arial" panose="020B0604020202020204" pitchFamily="34" charset="0"/>
+                <a:cs typeface="Arial" panose="020B0604020202020204" pitchFamily="34" charset="0"/>
+                <a:hlinkClick r:id="rId4"/>
+              </a:rPr>
+              <a:t>://code-maze.com/action-filters-aspnetcore</a:t>
+            </a:r>
+            <a:r>
+              <a:rPr lang="en-US" sz="1400" dirty="0" smtClean="0">
+                <a:latin typeface="Arial" panose="020B0604020202020204" pitchFamily="34" charset="0"/>
+                <a:cs typeface="Arial" panose="020B0604020202020204" pitchFamily="34" charset="0"/>
+                <a:hlinkClick r:id="rId4"/>
+              </a:rPr>
+              <a:t>/</a:t>
+            </a:r>
+            <a:endParaRPr lang="en-US" sz="1400" dirty="0" smtClean="0">
+              <a:latin typeface="Arial" panose="020B0604020202020204" pitchFamily="34" charset="0"/>
+              <a:cs typeface="Arial" panose="020B0604020202020204" pitchFamily="34" charset="0"/>
+            </a:endParaRPr>
+          </a:p>
+          <a:p>
+            <a:endParaRPr lang="en-US" sz="1400" dirty="0">
+              <a:latin typeface="Arial" panose="020B0604020202020204" pitchFamily="34" charset="0"/>
+              <a:cs typeface="Arial" panose="020B0604020202020204" pitchFamily="34" charset="0"/>
+            </a:endParaRPr>
+          </a:p>
+          <a:p>
+            <a:r>
+              <a:rPr lang="en-US" sz="1400" dirty="0" smtClean="0">
+                <a:latin typeface="Arial" panose="020B0604020202020204" pitchFamily="34" charset="0"/>
+                <a:cs typeface="Arial" panose="020B0604020202020204" pitchFamily="34" charset="0"/>
+              </a:rPr>
+              <a:t>Code First </a:t>
+            </a:r>
+            <a:r>
+              <a:rPr lang="en-US" sz="1400" dirty="0">
+                <a:latin typeface="Arial" panose="020B0604020202020204" pitchFamily="34" charset="0"/>
+                <a:cs typeface="Arial" panose="020B0604020202020204" pitchFamily="34" charset="0"/>
+              </a:rPr>
+              <a:t>EF Core =&gt; </a:t>
+            </a:r>
+            <a:r>
+              <a:rPr lang="en-US" sz="1400" dirty="0">
+                <a:latin typeface="Arial" panose="020B0604020202020204" pitchFamily="34" charset="0"/>
+                <a:cs typeface="Arial" panose="020B0604020202020204" pitchFamily="34" charset="0"/>
+                <a:hlinkClick r:id="rId5"/>
+              </a:rPr>
+              <a:t>https://code-maze.com/net-core-web-api-ef-core-code-first</a:t>
+            </a:r>
+            <a:r>
+              <a:rPr lang="en-US" sz="1400" dirty="0" smtClean="0">
+                <a:latin typeface="Arial" panose="020B0604020202020204" pitchFamily="34" charset="0"/>
+                <a:cs typeface="Arial" panose="020B0604020202020204" pitchFamily="34" charset="0"/>
+                <a:hlinkClick r:id="rId5"/>
+              </a:rPr>
+              <a:t>/</a:t>
+            </a:r>
+            <a:endParaRPr lang="en-US" sz="1400" dirty="0" smtClean="0">
+              <a:latin typeface="Arial" panose="020B0604020202020204" pitchFamily="34" charset="0"/>
+              <a:cs typeface="Arial" panose="020B0604020202020204" pitchFamily="34" charset="0"/>
+            </a:endParaRPr>
+          </a:p>
+          <a:p>
+            <a:endParaRPr lang="en-US" sz="1400" dirty="0">
+              <a:latin typeface="Arial" panose="020B0604020202020204" pitchFamily="34" charset="0"/>
+              <a:cs typeface="Arial" panose="020B0604020202020204" pitchFamily="34" charset="0"/>
+            </a:endParaRPr>
+          </a:p>
+          <a:p>
+            <a:r>
+              <a:rPr lang="en-US" sz="1400" dirty="0" smtClean="0">
+                <a:latin typeface="Arial" panose="020B0604020202020204" pitchFamily="34" charset="0"/>
+                <a:cs typeface="Arial" panose="020B0604020202020204" pitchFamily="34" charset="0"/>
+              </a:rPr>
+              <a:t>Db First </a:t>
+            </a:r>
+            <a:r>
+              <a:rPr lang="en-US" sz="1400" dirty="0">
+                <a:latin typeface="Arial" panose="020B0604020202020204" pitchFamily="34" charset="0"/>
+                <a:cs typeface="Arial" panose="020B0604020202020204" pitchFamily="34" charset="0"/>
+              </a:rPr>
+              <a:t>EF Core =&gt; </a:t>
+            </a:r>
+            <a:r>
+              <a:rPr lang="en-US" sz="1400" dirty="0">
+                <a:latin typeface="Arial" panose="020B0604020202020204" pitchFamily="34" charset="0"/>
+                <a:cs typeface="Arial" panose="020B0604020202020204" pitchFamily="34" charset="0"/>
+                <a:hlinkClick r:id="rId6"/>
+              </a:rPr>
+              <a:t>https://code-maze.com/netcore-web-api-db-first</a:t>
+            </a:r>
+            <a:r>
+              <a:rPr lang="en-US" sz="1400" dirty="0" smtClean="0">
+                <a:latin typeface="Arial" panose="020B0604020202020204" pitchFamily="34" charset="0"/>
+                <a:cs typeface="Arial" panose="020B0604020202020204" pitchFamily="34" charset="0"/>
+                <a:hlinkClick r:id="rId6"/>
+              </a:rPr>
+              <a:t>/</a:t>
+            </a:r>
+            <a:endParaRPr lang="en-US" sz="1400" dirty="0" smtClean="0">
+              <a:latin typeface="Arial" panose="020B0604020202020204" pitchFamily="34" charset="0"/>
+              <a:cs typeface="Arial" panose="020B0604020202020204" pitchFamily="34" charset="0"/>
+            </a:endParaRPr>
+          </a:p>
+          <a:p>
+            <a:endParaRPr lang="en-US" sz="1400" dirty="0">
+              <a:latin typeface="Arial" panose="020B0604020202020204" pitchFamily="34" charset="0"/>
+              <a:cs typeface="Arial" panose="020B0604020202020204" pitchFamily="34" charset="0"/>
+            </a:endParaRPr>
+          </a:p>
+          <a:p>
+            <a:r>
+              <a:rPr lang="en-US" sz="1400" dirty="0" smtClean="0">
+                <a:latin typeface="Arial" panose="020B0604020202020204" pitchFamily="34" charset="0"/>
+                <a:cs typeface="Arial" panose="020B0604020202020204" pitchFamily="34" charset="0"/>
+              </a:rPr>
+              <a:t>Best Practices .NET Core Web API </a:t>
+            </a:r>
+            <a:r>
+              <a:rPr lang="en-US" sz="1400" dirty="0">
+                <a:latin typeface="Arial" panose="020B0604020202020204" pitchFamily="34" charset="0"/>
+                <a:cs typeface="Arial" panose="020B0604020202020204" pitchFamily="34" charset="0"/>
+              </a:rPr>
+              <a:t>=&gt; </a:t>
+            </a:r>
+            <a:r>
+              <a:rPr lang="en-US" sz="1400" dirty="0">
+                <a:latin typeface="Arial" panose="020B0604020202020204" pitchFamily="34" charset="0"/>
+                <a:cs typeface="Arial" panose="020B0604020202020204" pitchFamily="34" charset="0"/>
+                <a:hlinkClick r:id="rId7"/>
+              </a:rPr>
+              <a:t>https://code-maze.com/aspnetcore-webapi-best-practices</a:t>
+            </a:r>
+            <a:r>
+              <a:rPr lang="en-US" sz="1400" dirty="0" smtClean="0">
+                <a:latin typeface="Arial" panose="020B0604020202020204" pitchFamily="34" charset="0"/>
+                <a:cs typeface="Arial" panose="020B0604020202020204" pitchFamily="34" charset="0"/>
+                <a:hlinkClick r:id="rId7"/>
+              </a:rPr>
+              <a:t>/</a:t>
+            </a:r>
+            <a:endParaRPr lang="en-US" sz="1400" dirty="0" smtClean="0">
+              <a:latin typeface="Arial" panose="020B0604020202020204" pitchFamily="34" charset="0"/>
+              <a:cs typeface="Arial" panose="020B0604020202020204" pitchFamily="34" charset="0"/>
+            </a:endParaRPr>
+          </a:p>
+          <a:p>
+            <a:endParaRPr lang="en-US" sz="1400" dirty="0">
+              <a:latin typeface="Arial" panose="020B0604020202020204" pitchFamily="34" charset="0"/>
+              <a:cs typeface="Arial" panose="020B0604020202020204" pitchFamily="34" charset="0"/>
+            </a:endParaRPr>
+          </a:p>
+          <a:p>
+            <a:r>
+              <a:rPr lang="en-US" sz="1400" dirty="0">
+                <a:latin typeface="Arial" panose="020B0604020202020204" pitchFamily="34" charset="0"/>
+                <a:cs typeface="Arial" panose="020B0604020202020204" pitchFamily="34" charset="0"/>
+              </a:rPr>
+              <a:t>Content Negotiation .NET Core =&gt; </a:t>
+            </a:r>
+            <a:r>
+              <a:rPr lang="en-US" sz="1400" dirty="0">
+                <a:latin typeface="Arial" panose="020B0604020202020204" pitchFamily="34" charset="0"/>
+                <a:cs typeface="Arial" panose="020B0604020202020204" pitchFamily="34" charset="0"/>
+                <a:hlinkClick r:id="rId8"/>
+              </a:rPr>
+              <a:t>https://code-maze.com/content-negotiation-dotnet-core</a:t>
+            </a:r>
+            <a:r>
+              <a:rPr lang="en-US" sz="1400" dirty="0" smtClean="0">
+                <a:latin typeface="Arial" panose="020B0604020202020204" pitchFamily="34" charset="0"/>
+                <a:cs typeface="Arial" panose="020B0604020202020204" pitchFamily="34" charset="0"/>
+                <a:hlinkClick r:id="rId8"/>
+              </a:rPr>
+              <a:t>/</a:t>
+            </a:r>
+            <a:endParaRPr lang="en-US" sz="1400" dirty="0" smtClean="0">
+              <a:latin typeface="Arial" panose="020B0604020202020204" pitchFamily="34" charset="0"/>
+              <a:cs typeface="Arial" panose="020B0604020202020204" pitchFamily="34" charset="0"/>
+            </a:endParaRPr>
+          </a:p>
+          <a:p>
+            <a:endParaRPr lang="en-US" sz="1400" dirty="0">
+              <a:latin typeface="Arial" panose="020B0604020202020204" pitchFamily="34" charset="0"/>
+              <a:cs typeface="Arial" panose="020B0604020202020204" pitchFamily="34" charset="0"/>
+            </a:endParaRPr>
+          </a:p>
+          <a:p>
+            <a:r>
+              <a:rPr lang="sr-Latn-RS" sz="1400" dirty="0" smtClean="0">
+                <a:latin typeface="Arial" panose="020B0604020202020204" pitchFamily="34" charset="0"/>
+                <a:cs typeface="Arial" panose="020B0604020202020204" pitchFamily="34" charset="0"/>
+              </a:rPr>
+              <a:t>Ove i mnoge druge informacije </a:t>
+            </a:r>
+            <a:r>
+              <a:rPr lang="en-US" sz="1400" dirty="0" smtClean="0">
+                <a:latin typeface="Arial" panose="020B0604020202020204" pitchFamily="34" charset="0"/>
+                <a:cs typeface="Arial" panose="020B0604020202020204" pitchFamily="34" charset="0"/>
+              </a:rPr>
+              <a:t>=&gt; </a:t>
+            </a:r>
+            <a:r>
+              <a:rPr lang="en-US" sz="1400" dirty="0" smtClean="0">
+                <a:latin typeface="Arial" panose="020B0604020202020204" pitchFamily="34" charset="0"/>
+                <a:cs typeface="Arial" panose="020B0604020202020204" pitchFamily="34" charset="0"/>
+                <a:hlinkClick r:id="rId9"/>
+              </a:rPr>
+              <a:t>https://www.google.rs</a:t>
+            </a:r>
+            <a:endParaRPr lang="en-US" sz="1400" dirty="0" smtClean="0">
+              <a:latin typeface="Arial" panose="020B0604020202020204" pitchFamily="34" charset="0"/>
+              <a:cs typeface="Arial" panose="020B0604020202020204" pitchFamily="34" charset="0"/>
+            </a:endParaRPr>
+          </a:p>
+        </p:txBody>
+      </p:sp>
+    </p:spTree>
+    <p:extLst>
+      <p:ext uri="{BB962C8B-B14F-4D97-AF65-F5344CB8AC3E}">
+        <p14:creationId xmlns:p14="http://schemas.microsoft.com/office/powerpoint/2010/main" val="225616452"/>
+      </p:ext>
+    </p:extLst>
+  </p:cSld>
+  <p:clrMapOvr>
+    <a:masterClrMapping/>
+  </p:clrMapOvr>
+  <p:timing>
+    <p:tnLst>
+      <p:par>
+        <p:cTn id="1" dur="indefinite" restart="never" nodeType="tmRoot">
+          <p:childTnLst>
+            <p:seq concurrent="1" nextAc="seek">
+              <p:cTn id="2" dur="indefinite" nodeType="mainSeq">
+                <p:childTnLst>
+                  <p:par>
+                    <p:cTn id="3" fill="hold">
+                      <p:stCondLst>
+                        <p:cond delay="indefinite"/>
+                      </p:stCondLst>
+                      <p:childTnLst>
+                        <p:par>
+                          <p:cTn id="4" fill="hold">
+                            <p:stCondLst>
+                              <p:cond delay="0"/>
+                            </p:stCondLst>
+                            <p:childTnLst>
+                              <p:par>
+                                <p:cTn id="5" presetID="2" presetClass="entr" presetSubtype="4" fill="hold" grpId="0" nodeType="clickEffect">
+                                  <p:stCondLst>
+                                    <p:cond delay="0"/>
+                                  </p:stCondLst>
+                                  <p:childTnLst>
+                                    <p:set>
+                                      <p:cBhvr>
+                                        <p:cTn id="6" dur="1" fill="hold">
+                                          <p:stCondLst>
+                                            <p:cond delay="0"/>
+                                          </p:stCondLst>
+                                        </p:cTn>
+                                        <p:tgtEl>
+                                          <p:spTgt spid="4"/>
+                                        </p:tgtEl>
+                                        <p:attrNameLst>
+                                          <p:attrName>style.visibility</p:attrName>
+                                        </p:attrNameLst>
+                                      </p:cBhvr>
+                                      <p:to>
+                                        <p:strVal val="visible"/>
+                                      </p:to>
+                                    </p:set>
+                                    <p:anim calcmode="lin" valueType="num">
+                                      <p:cBhvr additive="base">
+                                        <p:cTn id="7" dur="500" fill="hold"/>
+                                        <p:tgtEl>
+                                          <p:spTgt spid="4"/>
+                                        </p:tgtEl>
+                                        <p:attrNameLst>
+                                          <p:attrName>ppt_x</p:attrName>
+                                        </p:attrNameLst>
+                                      </p:cBhvr>
+                                      <p:tavLst>
+                                        <p:tav tm="0">
+                                          <p:val>
+                                            <p:strVal val="#ppt_x"/>
+                                          </p:val>
+                                        </p:tav>
+                                        <p:tav tm="100000">
+                                          <p:val>
+                                            <p:strVal val="#ppt_x"/>
+                                          </p:val>
+                                        </p:tav>
+                                      </p:tavLst>
+                                    </p:anim>
+                                    <p:anim calcmode="lin" valueType="num">
+                                      <p:cBhvr additive="base">
+                                        <p:cTn id="8" dur="500" fill="hold"/>
+                                        <p:tgtEl>
+                                          <p:spTgt spid="4"/>
                                         </p:tgtEl>
                                         <p:attrNameLst>
                                           <p:attrName>ppt_y</p:attrName>

</xml_diff>